<commit_message>
update with improved explanations
</commit_message>
<xml_diff>
--- a/student_lessons/A_Setup_Intro_Basics/Day1_live_B.pptx
+++ b/student_lessons/A_Setup_Intro_Basics/Day1_live_B.pptx
@@ -223,7 +223,7 @@
           <a:p>
             <a:fld id="{B0C0A60C-850A-4EA4-9C14-A8FE98B94505}" type="datetimeFigureOut">
               <a:rPr lang="en-US" smtClean="0"/>
-              <a:t>6/7/20</a:t>
+              <a:t>6/10/21</a:t>
             </a:fld>
             <a:endParaRPr lang="en-US"/>
           </a:p>
@@ -622,7 +622,7 @@
           <a:p>
             <a:fld id="{5738B90E-0779-4C36-915C-6F05FCD89456}" type="datetime1">
               <a:rPr lang="en-US" smtClean="0"/>
-              <a:t>6/7/20</a:t>
+              <a:t>6/10/21</a:t>
             </a:fld>
             <a:endParaRPr lang="en-US"/>
           </a:p>
@@ -802,7 +802,7 @@
           <a:p>
             <a:fld id="{7B9EA29D-D431-42FE-B7B6-AAE4454C77D3}" type="datetime1">
               <a:rPr lang="en-US" smtClean="0"/>
-              <a:t>6/7/20</a:t>
+              <a:t>6/10/21</a:t>
             </a:fld>
             <a:endParaRPr lang="en-US"/>
           </a:p>
@@ -1059,7 +1059,7 @@
           <a:p>
             <a:fld id="{690D8A1E-EA8F-46C1-B891-AE0C00D9C314}" type="datetime1">
               <a:rPr lang="en-US" smtClean="0"/>
-              <a:t>6/7/20</a:t>
+              <a:t>6/10/21</a:t>
             </a:fld>
             <a:endParaRPr lang="en-US"/>
           </a:p>
@@ -1350,7 +1350,7 @@
           <a:p>
             <a:fld id="{D753EFC8-4232-4598-94F6-94C0EBAFC469}" type="datetime1">
               <a:rPr lang="en-US" smtClean="0"/>
-              <a:t>6/7/20</a:t>
+              <a:t>6/10/21</a:t>
             </a:fld>
             <a:endParaRPr lang="en-US"/>
           </a:p>
@@ -1662,7 +1662,7 @@
           <a:p>
             <a:fld id="{F3161074-1C18-4AE7-957D-F18524378C85}" type="datetime1">
               <a:rPr lang="en-US" smtClean="0"/>
-              <a:t>6/7/20</a:t>
+              <a:t>6/10/21</a:t>
             </a:fld>
             <a:endParaRPr lang="en-US"/>
           </a:p>
@@ -1898,7 +1898,7 @@
           <a:p>
             <a:fld id="{69BE256C-8D9A-4404-B47D-41A1AE514425}" type="datetime1">
               <a:rPr lang="en-US" smtClean="0"/>
-              <a:t>6/7/20</a:t>
+              <a:t>6/10/21</a:t>
             </a:fld>
             <a:endParaRPr lang="en-US"/>
           </a:p>
@@ -2329,7 +2329,7 @@
           <a:p>
             <a:fld id="{66CB2154-9035-4012-8189-BAAB61C5A5EE}" type="datetime1">
               <a:rPr lang="en-US" smtClean="0"/>
-              <a:t>6/7/20</a:t>
+              <a:t>6/10/21</a:t>
             </a:fld>
             <a:endParaRPr lang="en-US"/>
           </a:p>
@@ -2500,7 +2500,7 @@
           <a:p>
             <a:fld id="{6700A58B-DD98-43D0-B791-721480A02982}" type="datetime1">
               <a:rPr lang="en-US" smtClean="0"/>
-              <a:t>6/7/20</a:t>
+              <a:t>6/10/21</a:t>
             </a:fld>
             <a:endParaRPr lang="en-US"/>
           </a:p>
@@ -2689,7 +2689,7 @@
           <a:p>
             <a:fld id="{7DB6E382-4F61-4E24-BE1A-377EC83D0E3A}" type="datetime1">
               <a:rPr lang="en-US" smtClean="0"/>
-              <a:t>6/7/20</a:t>
+              <a:t>6/10/21</a:t>
             </a:fld>
             <a:endParaRPr lang="en-US"/>
           </a:p>
@@ -2997,7 +2997,7 @@
           <a:p>
             <a:fld id="{4142EED6-FC16-45B9-B8C4-2BC5DBA88325}" type="datetime1">
               <a:rPr lang="en-US" smtClean="0"/>
-              <a:t>6/7/20</a:t>
+              <a:t>6/10/21</a:t>
             </a:fld>
             <a:endParaRPr lang="en-US"/>
           </a:p>
@@ -3312,7 +3312,7 @@
           <a:p>
             <a:fld id="{DF59512B-4F1D-43D7-8819-2F53FEF69650}" type="datetime1">
               <a:rPr lang="en-US" smtClean="0"/>
-              <a:t>6/7/20</a:t>
+              <a:t>6/10/21</a:t>
             </a:fld>
             <a:endParaRPr lang="en-US"/>
           </a:p>
@@ -3585,7 +3585,7 @@
           <a:p>
             <a:fld id="{08437B94-E2BF-44DC-ADC5-B05FC9934E9D}" type="datetime1">
               <a:rPr lang="en-US" smtClean="0"/>
-              <a:t>6/7/20</a:t>
+              <a:t>6/10/21</a:t>
             </a:fld>
             <a:endParaRPr lang="en-US"/>
           </a:p>
@@ -4108,7 +4108,7 @@
           <a:p>
             <a:fld id="{5738B90E-0779-4C36-915C-6F05FCD89456}" type="datetime1">
               <a:rPr lang="en-US" smtClean="0"/>
-              <a:t>6/7/20</a:t>
+              <a:t>6/10/21</a:t>
             </a:fld>
             <a:endParaRPr lang="en-US"/>
           </a:p>
@@ -4292,7 +4292,7 @@
           <a:p>
             <a:fld id="{6700A58B-DD98-43D0-B791-721480A02982}" type="datetime1">
               <a:rPr lang="en-US" smtClean="0"/>
-              <a:t>6/7/20</a:t>
+              <a:t>6/10/21</a:t>
             </a:fld>
             <a:endParaRPr lang="en-US"/>
           </a:p>
@@ -4897,7 +4897,7 @@
           <a:p>
             <a:fld id="{6700A58B-DD98-43D0-B791-721480A02982}" type="datetime1">
               <a:rPr lang="en-US" smtClean="0"/>
-              <a:t>6/7/20</a:t>
+              <a:t>6/10/21</a:t>
             </a:fld>
             <a:endParaRPr lang="en-US"/>
           </a:p>
@@ -5096,7 +5096,7 @@
           <a:p>
             <a:fld id="{6700A58B-DD98-43D0-B791-721480A02982}" type="datetime1">
               <a:rPr lang="en-US" smtClean="0"/>
-              <a:t>6/7/20</a:t>
+              <a:t>6/10/21</a:t>
             </a:fld>
             <a:endParaRPr lang="en-US"/>
           </a:p>
@@ -6164,7 +6164,7 @@
           <a:p>
             <a:fld id="{6700A58B-DD98-43D0-B791-721480A02982}" type="datetime1">
               <a:rPr lang="en-US" smtClean="0"/>
-              <a:t>6/7/20</a:t>
+              <a:t>6/10/21</a:t>
             </a:fld>
             <a:endParaRPr lang="en-US"/>
           </a:p>
@@ -6507,7 +6507,7 @@
           <a:p>
             <a:fld id="{6700A58B-DD98-43D0-B791-721480A02982}" type="datetime1">
               <a:rPr lang="en-US" smtClean="0"/>
-              <a:t>6/7/20</a:t>
+              <a:t>6/10/21</a:t>
             </a:fld>
             <a:endParaRPr lang="en-US"/>
           </a:p>
@@ -6808,7 +6808,7 @@
           <a:p>
             <a:fld id="{6700A58B-DD98-43D0-B791-721480A02982}" type="datetime1">
               <a:rPr lang="en-US" smtClean="0"/>
-              <a:t>6/7/20</a:t>
+              <a:t>6/10/21</a:t>
             </a:fld>
             <a:endParaRPr lang="en-US"/>
           </a:p>
@@ -7210,7 +7210,7 @@
           <a:p>
             <a:fld id="{6700A58B-DD98-43D0-B791-721480A02982}" type="datetime1">
               <a:rPr lang="en-US" smtClean="0"/>
-              <a:t>6/7/20</a:t>
+              <a:t>6/10/21</a:t>
             </a:fld>
             <a:endParaRPr lang="en-US"/>
           </a:p>
@@ -7703,7 +7703,7 @@
           <a:p>
             <a:fld id="{6700A58B-DD98-43D0-B791-721480A02982}" type="datetime1">
               <a:rPr lang="en-US" smtClean="0"/>
-              <a:t>6/7/20</a:t>
+              <a:t>6/10/21</a:t>
             </a:fld>
             <a:endParaRPr lang="en-US"/>
           </a:p>
@@ -7786,7 +7786,7 @@
         <p:spPr>
           <a:xfrm>
             <a:off x="362606" y="1371601"/>
-            <a:ext cx="2879314" cy="1200329"/>
+            <a:ext cx="2879314" cy="646331"/>
           </a:xfrm>
           <a:prstGeom prst="rect">
             <a:avLst/>
@@ -7817,47 +7817,7 @@
                 <a:latin typeface="Consolas" panose="020B0609020204030204" pitchFamily="49" charset="0"/>
                 <a:cs typeface="Consolas" panose="020B0609020204030204" pitchFamily="49" charset="0"/>
               </a:rPr>
-              <a:t>hunspell_check</a:t>
-            </a:r>
-            <a:r>
-              <a:rPr lang="en-US" dirty="0">
-                <a:latin typeface="Consolas" panose="020B0609020204030204" pitchFamily="49" charset="0"/>
-                <a:cs typeface="Consolas" panose="020B0609020204030204" pitchFamily="49" charset="0"/>
-              </a:rPr>
-              <a:t>(…)</a:t>
-            </a:r>
-          </a:p>
-          <a:p>
-            <a:pPr marL="285750" indent="-285750">
-              <a:buFont typeface="Arial" panose="020B0604020202020204" pitchFamily="34" charset="0"/>
-              <a:buChar char="•"/>
-            </a:pPr>
-            <a:r>
-              <a:rPr lang="en-US" dirty="0" err="1">
-                <a:latin typeface="Consolas" panose="020B0609020204030204" pitchFamily="49" charset="0"/>
-                <a:cs typeface="Consolas" panose="020B0609020204030204" pitchFamily="49" charset="0"/>
-              </a:rPr>
-              <a:t>hunspell_suggest</a:t>
-            </a:r>
-            <a:r>
-              <a:rPr lang="en-US" dirty="0">
-                <a:latin typeface="Consolas" panose="020B0609020204030204" pitchFamily="49" charset="0"/>
-                <a:cs typeface="Consolas" panose="020B0609020204030204" pitchFamily="49" charset="0"/>
-              </a:rPr>
-              <a:t>(…)</a:t>
-            </a:r>
-          </a:p>
-          <a:p>
-            <a:pPr marL="285750" indent="-285750">
-              <a:buFont typeface="Arial" panose="020B0604020202020204" pitchFamily="34" charset="0"/>
-              <a:buChar char="•"/>
-            </a:pPr>
-            <a:r>
-              <a:rPr lang="en-US" dirty="0" err="1">
-                <a:latin typeface="Consolas" panose="020B0609020204030204" pitchFamily="49" charset="0"/>
-                <a:cs typeface="Consolas" panose="020B0609020204030204" pitchFamily="49" charset="0"/>
-              </a:rPr>
-              <a:t>hunspell_analyze</a:t>
+              <a:t>spell_check_text</a:t>
             </a:r>
             <a:r>
               <a:rPr lang="en-US" dirty="0">
@@ -8220,7 +8180,7 @@
           <a:p>
             <a:fld id="{6700A58B-DD98-43D0-B791-721480A02982}" type="datetime1">
               <a:rPr lang="en-US" smtClean="0"/>
-              <a:t>6/7/20</a:t>
+              <a:t>6/10/21</a:t>
             </a:fld>
             <a:endParaRPr lang="en-US"/>
           </a:p>

</xml_diff>